<commit_message>
Update Thesis Proposal Defence.pptx
</commit_message>
<xml_diff>
--- a/Thesis Proposal Defence.pptx
+++ b/Thesis Proposal Defence.pptx
@@ -209,7 +209,7 @@
           <a:p>
             <a:fld id="{1BF8C320-1D1B-4A01-A637-3E15027DC91A}" type="datetimeFigureOut">
               <a:rPr lang="en-CA" smtClean="0"/>
-              <a:t>2025-12-02</a:t>
+              <a:t>2025-12-03</a:t>
             </a:fld>
             <a:endParaRPr lang="en-CA"/>
           </a:p>
@@ -2878,7 +2878,7 @@
           <a:p>
             <a:fld id="{78ED8958-4744-4512-A73A-B7842DF6E36C}" type="datetimeFigureOut">
               <a:rPr lang="en-CA" smtClean="0"/>
-              <a:t>2025-12-02</a:t>
+              <a:t>2025-12-03</a:t>
             </a:fld>
             <a:endParaRPr lang="en-CA"/>
           </a:p>
@@ -3078,7 +3078,7 @@
           <a:p>
             <a:fld id="{78ED8958-4744-4512-A73A-B7842DF6E36C}" type="datetimeFigureOut">
               <a:rPr lang="en-CA" smtClean="0"/>
-              <a:t>2025-12-02</a:t>
+              <a:t>2025-12-03</a:t>
             </a:fld>
             <a:endParaRPr lang="en-CA"/>
           </a:p>
@@ -3288,7 +3288,7 @@
           <a:p>
             <a:fld id="{78ED8958-4744-4512-A73A-B7842DF6E36C}" type="datetimeFigureOut">
               <a:rPr lang="en-CA" smtClean="0"/>
-              <a:t>2025-12-02</a:t>
+              <a:t>2025-12-03</a:t>
             </a:fld>
             <a:endParaRPr lang="en-CA"/>
           </a:p>
@@ -5226,7 +5226,7 @@
           <a:p>
             <a:fld id="{78ED8958-4744-4512-A73A-B7842DF6E36C}" type="datetimeFigureOut">
               <a:rPr lang="en-CA" smtClean="0"/>
-              <a:t>2025-12-02</a:t>
+              <a:t>2025-12-03</a:t>
             </a:fld>
             <a:endParaRPr lang="en-CA"/>
           </a:p>
@@ -5502,7 +5502,7 @@
           <a:p>
             <a:fld id="{78ED8958-4744-4512-A73A-B7842DF6E36C}" type="datetimeFigureOut">
               <a:rPr lang="en-CA" smtClean="0"/>
-              <a:t>2025-12-02</a:t>
+              <a:t>2025-12-03</a:t>
             </a:fld>
             <a:endParaRPr lang="en-CA"/>
           </a:p>
@@ -5770,7 +5770,7 @@
           <a:p>
             <a:fld id="{78ED8958-4744-4512-A73A-B7842DF6E36C}" type="datetimeFigureOut">
               <a:rPr lang="en-CA" smtClean="0"/>
-              <a:t>2025-12-02</a:t>
+              <a:t>2025-12-03</a:t>
             </a:fld>
             <a:endParaRPr lang="en-CA"/>
           </a:p>
@@ -6185,7 +6185,7 @@
           <a:p>
             <a:fld id="{78ED8958-4744-4512-A73A-B7842DF6E36C}" type="datetimeFigureOut">
               <a:rPr lang="en-CA" smtClean="0"/>
-              <a:t>2025-12-02</a:t>
+              <a:t>2025-12-03</a:t>
             </a:fld>
             <a:endParaRPr lang="en-CA"/>
           </a:p>
@@ -6327,7 +6327,7 @@
           <a:p>
             <a:fld id="{78ED8958-4744-4512-A73A-B7842DF6E36C}" type="datetimeFigureOut">
               <a:rPr lang="en-CA" smtClean="0"/>
-              <a:t>2025-12-02</a:t>
+              <a:t>2025-12-03</a:t>
             </a:fld>
             <a:endParaRPr lang="en-CA"/>
           </a:p>
@@ -6440,7 +6440,7 @@
           <a:p>
             <a:fld id="{78ED8958-4744-4512-A73A-B7842DF6E36C}" type="datetimeFigureOut">
               <a:rPr lang="en-CA" smtClean="0"/>
-              <a:t>2025-12-02</a:t>
+              <a:t>2025-12-03</a:t>
             </a:fld>
             <a:endParaRPr lang="en-CA"/>
           </a:p>
@@ -6753,7 +6753,7 @@
           <a:p>
             <a:fld id="{78ED8958-4744-4512-A73A-B7842DF6E36C}" type="datetimeFigureOut">
               <a:rPr lang="en-CA" smtClean="0"/>
-              <a:t>2025-12-02</a:t>
+              <a:t>2025-12-03</a:t>
             </a:fld>
             <a:endParaRPr lang="en-CA"/>
           </a:p>
@@ -7042,7 +7042,7 @@
           <a:p>
             <a:fld id="{78ED8958-4744-4512-A73A-B7842DF6E36C}" type="datetimeFigureOut">
               <a:rPr lang="en-CA" smtClean="0"/>
-              <a:t>2025-12-02</a:t>
+              <a:t>2025-12-03</a:t>
             </a:fld>
             <a:endParaRPr lang="en-CA"/>
           </a:p>
@@ -7285,7 +7285,7 @@
           <a:p>
             <a:fld id="{78ED8958-4744-4512-A73A-B7842DF6E36C}" type="datetimeFigureOut">
               <a:rPr lang="en-CA" smtClean="0"/>
-              <a:t>2025-12-02</a:t>
+              <a:t>2025-12-03</a:t>
             </a:fld>
             <a:endParaRPr lang="en-CA"/>
           </a:p>
@@ -8114,7 +8114,7 @@
         </p:nvSpPr>
         <p:spPr>
           <a:xfrm>
-            <a:off x="1886850" y="1555742"/>
+            <a:off x="1886850" y="458462"/>
             <a:ext cx="8418300" cy="861600"/>
           </a:xfrm>
           <a:prstGeom prst="rect">
@@ -8150,8 +8150,8 @@
         </p:nvSpPr>
         <p:spPr>
           <a:xfrm>
-            <a:off x="4400550" y="2451209"/>
-            <a:ext cx="3390900" cy="2583122"/>
+            <a:off x="457200" y="1353929"/>
+            <a:ext cx="11144250" cy="2583122"/>
           </a:xfrm>
           <a:prstGeom prst="rect">
             <a:avLst/>
@@ -8172,8 +8172,8 @@
               <a:buChar char="•"/>
             </a:pPr>
             <a:r>
-              <a:rPr lang="en-CA" dirty="0"/>
-              <a:t>Chapter 1: Abstract</a:t>
+              <a:rPr lang="en-US" dirty="0"/>
+              <a:t>Chapter 1: Introduction - Establishes the research context for FPGA-based GRU implementation in BCI applications and defines the central research question examining design parameter trade-offs.</a:t>
             </a:r>
           </a:p>
           <a:p>
@@ -8182,8 +8182,8 @@
               <a:buChar char="•"/>
             </a:pPr>
             <a:r>
-              <a:rPr lang="en-CA" dirty="0"/>
-              <a:t>Chapter 2: Introduction</a:t>
+              <a:rPr lang="en-US" dirty="0"/>
+              <a:t>Chapter 2: Literature Review - Surveys existing work on GRUs, FPGAs, and BCIs while identifying gaps in hardware-specific optimizations and justifying systematic design space exploration.</a:t>
             </a:r>
           </a:p>
           <a:p>
@@ -8192,8 +8192,16 @@
               <a:buChar char="•"/>
             </a:pPr>
             <a:r>
-              <a:rPr lang="en-CA" dirty="0"/>
-              <a:t>Chapter 3: Literature Review</a:t>
+              <a:rPr lang="en-US" dirty="0"/>
+              <a:t>Chapter 3: Methodology - Describes the automated framework using Python and </a:t>
+            </a:r>
+            <a:r>
+              <a:rPr lang="en-US" dirty="0" err="1"/>
+              <a:t>Tcl</a:t>
+            </a:r>
+            <a:r>
+              <a:rPr lang="en-US" dirty="0"/>
+              <a:t> to generate parameterized GRU modules, synthesize them via Xilinx Vivado, and analyze performance metrics.</a:t>
             </a:r>
           </a:p>
           <a:p>
@@ -8202,8 +8210,8 @@
               <a:buChar char="•"/>
             </a:pPr>
             <a:r>
-              <a:rPr lang="en-CA" dirty="0"/>
-              <a:t>Chapter 4: Methodology</a:t>
+              <a:rPr lang="en-US" dirty="0"/>
+              <a:t>Chapter 4: Results - Presents hardware and accuracy metrics across tested configurations, demonstrating how design parameters affect resource utilization, timing, power consumption, and error rates.</a:t>
             </a:r>
           </a:p>
           <a:p>
@@ -8212,8 +8220,8 @@
               <a:buChar char="•"/>
             </a:pPr>
             <a:r>
-              <a:rPr lang="en-CA" dirty="0"/>
-              <a:t>Chapter 5: Results</a:t>
+              <a:rPr lang="en-US" dirty="0"/>
+              <a:t>Chapter 5: Discussion - Interprets experimental findings, analyzes hardware optimization effectiveness, and discusses implications for optimal BCI system design while acknowledging study limitations.</a:t>
             </a:r>
           </a:p>
           <a:p>
@@ -8222,8 +8230,8 @@
               <a:buChar char="•"/>
             </a:pPr>
             <a:r>
-              <a:rPr lang="en-CA" dirty="0"/>
-              <a:t>Chapter 6: Discussion</a:t>
+              <a:rPr lang="en-US" dirty="0"/>
+              <a:t>Chapter 6: Future Work - Outlines research extensions including physical hardware validation, additional optimization exploration, and real-time testing with human EEG data.</a:t>
             </a:r>
           </a:p>
           <a:p>
@@ -8232,8 +8240,8 @@
               <a:buChar char="•"/>
             </a:pPr>
             <a:r>
-              <a:rPr lang="en-CA" dirty="0"/>
-              <a:t>Chapter 7: Future Work</a:t>
+              <a:rPr lang="en-US" dirty="0"/>
+              <a:t>Chapter 7: Conclusion - Summarizes key contributions including the automated exploration tool, quantified trade-offs, and design guidelines for low-power, real-time BCI systems.</a:t>
             </a:r>
           </a:p>
           <a:p>
@@ -8242,18 +8250,8 @@
               <a:buChar char="•"/>
             </a:pPr>
             <a:r>
-              <a:rPr lang="en-CA" dirty="0"/>
-              <a:t>Chapter 8: Conclusion</a:t>
-            </a:r>
-          </a:p>
-          <a:p>
-            <a:pPr marL="285750" indent="-285750">
-              <a:buFont typeface="Arial" panose="020B0604020202020204" pitchFamily="34" charset="0"/>
-              <a:buChar char="•"/>
-            </a:pPr>
-            <a:r>
-              <a:rPr lang="en-CA" dirty="0"/>
-              <a:t>Chapter 9: References</a:t>
+              <a:rPr lang="en-US" dirty="0"/>
+              <a:t>Chapter 8: References - Provides IEEE-formatted citations for all academic sources referenced throughout the thesis.</a:t>
             </a:r>
           </a:p>
         </p:txBody>
@@ -9429,6 +9427,25 @@
           </a:bodyPr>
           <a:lstStyle/>
           <a:p>
+            <a:pPr>
+              <a:lnSpc>
+                <a:spcPct val="90000"/>
+              </a:lnSpc>
+              <a:spcBef>
+                <a:spcPts val="1000"/>
+              </a:spcBef>
+            </a:pPr>
+            <a:r>
+              <a:rPr lang="en-US" sz="2000" dirty="0">
+                <a:latin typeface="Calibri"/>
+                <a:ea typeface="Calibri"/>
+                <a:cs typeface="Calibri"/>
+                <a:sym typeface="Calibri"/>
+              </a:rPr>
+              <a:t>Hardware implementations of GRUs are scarce, with only two documented implementations. Limited implementations probably due to GRUs being new and less used compared to LSTMs [3]</a:t>
+            </a:r>
+          </a:p>
+          <a:p>
             <a:pPr marL="342900" lvl="0" indent="-342900" algn="l" rtl="0">
               <a:lnSpc>
                 <a:spcPct val="90000"/>
@@ -9449,7 +9466,7 @@
                 <a:cs typeface="Calibri"/>
                 <a:sym typeface="Calibri"/>
               </a:rPr>
-              <a:t>Hardware implementations of GRUs are scarce, with only two documented implementations</a:t>
+              <a:t>Zaghloul et al. [1] first implemented an FPGA-based GRU, demonstrating equivalent performance to LSTMs across multiple time-series datasets</a:t>
             </a:r>
           </a:p>
           <a:p>
@@ -9473,7 +9490,7 @@
                 <a:cs typeface="Calibri"/>
                 <a:sym typeface="Calibri"/>
               </a:rPr>
-              <a:t>Zaghloul et al. [1] first implemented an FPGA-based GRU, demonstrating equivalent performance to LSTMs across multiple time-series datasets</a:t>
+              <a:t>Rizwan et al. [2] reimplemented GRUs with a focus on detecting breast cancer (multivariate classification) </a:t>
             </a:r>
           </a:p>
           <a:p>
@@ -9497,77 +9514,8 @@
                 <a:cs typeface="Calibri"/>
                 <a:sym typeface="Calibri"/>
               </a:rPr>
-              <a:t>Rizwan et al. [2] reimplemented GRUs with a focus on detecting breast cancer (multivariate classification) </a:t>
-            </a:r>
-          </a:p>
-          <a:p>
-            <a:pPr marL="342900" lvl="0" indent="-342900" algn="l" rtl="0">
-              <a:lnSpc>
-                <a:spcPct val="90000"/>
-              </a:lnSpc>
-              <a:spcBef>
-                <a:spcPts val="1000"/>
-              </a:spcBef>
-              <a:spcAft>
-                <a:spcPts val="0"/>
-              </a:spcAft>
-              <a:buFont typeface="Arial" panose="020B0604020202020204" pitchFamily="34" charset="0"/>
-              <a:buChar char="•"/>
-            </a:pPr>
-            <a:r>
-              <a:rPr lang="en-US" sz="2000" dirty="0">
-                <a:latin typeface="Calibri"/>
-                <a:ea typeface="Calibri"/>
-                <a:cs typeface="Calibri"/>
-                <a:sym typeface="Calibri"/>
-              </a:rPr>
               <a:t>No prior work has explored GRU hardware optimization or hardware GRUs applied to BCI</a:t>
             </a:r>
-          </a:p>
-          <a:p>
-            <a:pPr marL="342900" lvl="0" indent="-342900" algn="l" rtl="0">
-              <a:lnSpc>
-                <a:spcPct val="90000"/>
-              </a:lnSpc>
-              <a:spcBef>
-                <a:spcPts val="1000"/>
-              </a:spcBef>
-              <a:spcAft>
-                <a:spcPts val="0"/>
-              </a:spcAft>
-              <a:buFont typeface="Arial" panose="020B0604020202020204" pitchFamily="34" charset="0"/>
-              <a:buChar char="•"/>
-            </a:pPr>
-            <a:r>
-              <a:rPr lang="en-US" sz="2000" dirty="0">
-                <a:latin typeface="Calibri"/>
-                <a:ea typeface="Calibri"/>
-                <a:cs typeface="Calibri"/>
-                <a:sym typeface="Calibri"/>
-              </a:rPr>
-              <a:t>Limited implementations due to GRUs being new and less used compared to LSTMs [3]</a:t>
-            </a:r>
-          </a:p>
-          <a:p>
-            <a:pPr marL="342900" lvl="0" indent="-342900" algn="l" rtl="0">
-              <a:lnSpc>
-                <a:spcPct val="90000"/>
-              </a:lnSpc>
-              <a:spcBef>
-                <a:spcPts val="1000"/>
-              </a:spcBef>
-              <a:spcAft>
-                <a:spcPts val="0"/>
-              </a:spcAft>
-              <a:buFont typeface="Arial" panose="020B0604020202020204" pitchFamily="34" charset="0"/>
-              <a:buChar char="•"/>
-            </a:pPr>
-            <a:endParaRPr sz="2000" dirty="0">
-              <a:latin typeface="Calibri"/>
-              <a:ea typeface="Calibri"/>
-              <a:cs typeface="Calibri"/>
-              <a:sym typeface="Calibri"/>
-            </a:endParaRPr>
           </a:p>
         </p:txBody>
       </p:sp>
@@ -10283,8 +10231,8 @@
         </p:nvSpPr>
         <p:spPr>
           <a:xfrm>
-            <a:off x="876300" y="1582478"/>
-            <a:ext cx="10439400" cy="3984793"/>
+            <a:off x="876300" y="1353878"/>
+            <a:ext cx="10439400" cy="5504122"/>
           </a:xfrm>
           <a:prstGeom prst="rect">
             <a:avLst/>
@@ -10301,64 +10249,118 @@
           <a:lstStyle/>
           <a:p>
             <a:r>
-              <a:rPr lang="en-CA" sz="2000" dirty="0"/>
-              <a:t>The experimental system comprises several interconnected Python modules and a </a:t>
-            </a:r>
-            <a:r>
-              <a:rPr lang="en-CA" sz="2000" dirty="0" err="1"/>
+              <a:rPr lang="en-US" sz="2000" dirty="0"/>
+              <a:t>Methodological Challenge: Manual modification of the GRU module for each individual design parameter subset would be prohibitively labor-intensive and inefficient, necessitating an automated approach to parameter space exploration.</a:t>
+            </a:r>
+          </a:p>
+          <a:p>
+            <a:endParaRPr lang="en-US" sz="2000" dirty="0"/>
+          </a:p>
+          <a:p>
+            <a:r>
+              <a:rPr lang="en-US" sz="2000" dirty="0"/>
+              <a:t>Methodological Approach: To address this constraint, an automated design space exploration tool utilizing Python and </a:t>
+            </a:r>
+            <a:r>
+              <a:rPr lang="en-US" sz="2000" dirty="0" err="1"/>
               <a:t>Tcl</a:t>
             </a:r>
             <a:r>
-              <a:rPr lang="en-CA" sz="2000" dirty="0"/>
-              <a:t> script that automate the entire design, implementation, and analysis pipeline:</a:t>
-            </a:r>
-          </a:p>
-          <a:p>
-            <a:pPr marL="342900" lvl="0" indent="-342900">
+              <a:rPr lang="en-US" sz="2000" dirty="0"/>
+              <a:t> was developed.</a:t>
+            </a:r>
+          </a:p>
+          <a:p>
+            <a:pPr marL="342900" indent="-342900">
               <a:buFont typeface="Arial" panose="020B0604020202020204" pitchFamily="34" charset="0"/>
               <a:buChar char="•"/>
             </a:pPr>
             <a:r>
-              <a:rPr lang="en-CA" sz="2000" dirty="0"/>
-              <a:t>Python scripts automatically generate SystemVerilog code for the GRU module, top-level wrapper, and testbench based on specified parameters.</a:t>
-            </a:r>
-          </a:p>
-          <a:p>
-            <a:pPr marL="342900" lvl="0" indent="-342900">
+              <a:rPr lang="en-US" sz="2000" dirty="0"/>
+              <a:t>The tool automates the complete workflow encompassing design specification, hardware implementation, and performance analysis.</a:t>
+            </a:r>
+          </a:p>
+          <a:p>
+            <a:pPr marL="342900" indent="-342900">
               <a:buFont typeface="Arial" panose="020B0604020202020204" pitchFamily="34" charset="0"/>
               <a:buChar char="•"/>
             </a:pPr>
             <a:r>
-              <a:rPr lang="en-CA" sz="2000" dirty="0"/>
-              <a:t>A </a:t>
-            </a:r>
-            <a:r>
-              <a:rPr lang="en-CA" sz="2000" dirty="0" err="1"/>
-              <a:t>Tcl</a:t>
-            </a:r>
-            <a:r>
-              <a:rPr lang="en-CA" sz="2000" dirty="0"/>
-              <a:t> script orchestrates the Xilinx Vivado tool to perform simulation, synthesis, optimization, placement, and routing while generating detailed reports.</a:t>
-            </a:r>
-          </a:p>
-          <a:p>
-            <a:pPr marL="342900" lvl="0" indent="-342900">
+              <a:rPr lang="en-US" sz="2000" dirty="0"/>
+              <a:t>Xilinx Vivado serves as the synthesis and implementation backend, providing comprehensive design metrics and resource utilization data.</a:t>
+            </a:r>
+          </a:p>
+          <a:p>
+            <a:pPr marL="342900" indent="-342900">
               <a:buFont typeface="Arial" panose="020B0604020202020204" pitchFamily="34" charset="0"/>
               <a:buChar char="•"/>
             </a:pPr>
             <a:r>
-              <a:rPr lang="en-CA" sz="2000" dirty="0"/>
-              <a:t>Python scripts parse Vivado-generated reports and simulation outputs to extract hardware metrics and calculate accuracy measurements.</a:t>
-            </a:r>
-          </a:p>
-          <a:p>
-            <a:pPr marL="342900" lvl="0" indent="-342900">
+              <a:rPr lang="en-US" sz="2000" dirty="0"/>
+              <a:t>The tech stack ensures cross-platform capabilities.</a:t>
+            </a:r>
+          </a:p>
+          <a:p>
+            <a:pPr marL="342900" indent="-342900">
               <a:buFont typeface="Arial" panose="020B0604020202020204" pitchFamily="34" charset="0"/>
               <a:buChar char="•"/>
             </a:pPr>
-            <a:r>
-              <a:rPr lang="en-CA" sz="2000" dirty="0"/>
-              <a:t>The main script coordinates all phases, collects results, calculates Mean Absolute Error (MAE), and compiles data into a structured format for analysis.</a:t>
+            <a:endParaRPr lang="en-US" sz="2000" dirty="0"/>
+          </a:p>
+          <a:p>
+            <a:r>
+              <a:rPr lang="en-US" sz="2000" dirty="0"/>
+              <a:t>Desired action space to search:</a:t>
+            </a:r>
+          </a:p>
+          <a:p>
+            <a:pPr marL="742950" lvl="1" indent="-285750">
+              <a:buFont typeface="Arial" panose="020B0604020202020204" pitchFamily="34" charset="0"/>
+              <a:buChar char="•"/>
+            </a:pPr>
+            <a:r>
+              <a:rPr lang="en-CA" dirty="0"/>
+              <a:t>INT_WIDTH: 6 </a:t>
+            </a:r>
+          </a:p>
+          <a:p>
+            <a:pPr marL="742950" lvl="1" indent="-285750">
+              <a:buFont typeface="Arial" panose="020B0604020202020204" pitchFamily="34" charset="0"/>
+              <a:buChar char="•"/>
+            </a:pPr>
+            <a:r>
+              <a:rPr lang="en-CA" dirty="0"/>
+              <a:t>FRAC_WIDTH: 4, 9, 14, 19, 24</a:t>
+            </a:r>
+          </a:p>
+          <a:p>
+            <a:pPr marL="742950" lvl="1" indent="-285750">
+              <a:buFont typeface="Arial" panose="020B0604020202020204" pitchFamily="34" charset="0"/>
+              <a:buChar char="•"/>
+            </a:pPr>
+            <a:r>
+              <a:rPr lang="en-CA" dirty="0"/>
+              <a:t>d: 4, 8, 16, 32, 64</a:t>
+            </a:r>
+          </a:p>
+          <a:p>
+            <a:pPr marL="742950" lvl="1" indent="-285750">
+              <a:buFont typeface="Arial" panose="020B0604020202020204" pitchFamily="34" charset="0"/>
+              <a:buChar char="•"/>
+            </a:pPr>
+            <a:r>
+              <a:rPr lang="en-CA" dirty="0"/>
+              <a:t>h: 4, 6, 8, 12, 16</a:t>
+            </a:r>
+          </a:p>
+          <a:p>
+            <a:pPr marL="742950" lvl="1" indent="-285750">
+              <a:buFont typeface="Arial" panose="020B0604020202020204" pitchFamily="34" charset="0"/>
+              <a:buChar char="•"/>
+            </a:pPr>
+            <a:r>
+              <a:rPr lang="en-CA" dirty="0"/>
+              <a:t>Shift-and-Add Multiplication: 0, 1</a:t>
             </a:r>
           </a:p>
         </p:txBody>
@@ -10512,15 +10514,7 @@
             </a:pPr>
             <a:r>
               <a:rPr lang="en-CA" dirty="0"/>
-              <a:t>Vivado Execution: The TCL script (</a:t>
-            </a:r>
-            <a:r>
-              <a:rPr lang="en-CA" dirty="0" err="1"/>
-              <a:t>run_vivado.tcl</a:t>
-            </a:r>
-            <a:r>
-              <a:rPr lang="en-CA" dirty="0"/>
-              <a:t>) performs the following operations: Creates a Vivado project, adds all generated SystemVerilog files, applies timing constraints, runs simulation, executes synthesis, performs placement and routing, generates detailed reports on utilization, timing, and power consumption.</a:t>
+              <a:t>Vivado Execution: The TCL script performs the following operations: Creates a Vivado project, adds all generated SystemVerilog files, applies timing constraints, runs simulation, executes synthesis, performs placement and routing, generates detailed reports on utilization, timing, and power consumption.</a:t>
             </a:r>
           </a:p>
           <a:p>
@@ -10736,7 +10730,7 @@
             </a:pPr>
             <a:r>
               <a:rPr lang="en-CA" dirty="0"/>
-              <a:t>Simulations and implementations took about 1 day to complete</a:t>
+              <a:t>Simulations and implementations took about 1 day to complete.</a:t>
             </a:r>
           </a:p>
           <a:p>
@@ -10746,7 +10740,7 @@
             </a:pPr>
             <a:r>
               <a:rPr lang="en-CA" dirty="0"/>
-              <a:t>To run the entire action space, will run on a desktop better suited for Vivado</a:t>
+              <a:t>To run the entire action space, will run on a desktop better suited for Vivado.</a:t>
             </a:r>
           </a:p>
           <a:p>
@@ -10756,7 +10750,7 @@
             </a:pPr>
             <a:r>
               <a:rPr lang="en-CA" dirty="0"/>
-              <a:t>CPU with a better single core performance and higher clock rate</a:t>
+              <a:t>CPU with a better single core performance and higher clock rate.</a:t>
             </a:r>
           </a:p>
           <a:p>
@@ -10766,7 +10760,7 @@
             </a:pPr>
             <a:r>
               <a:rPr lang="en-CA" dirty="0"/>
-              <a:t>Larger amount of and higher frequency RAM</a:t>
+              <a:t>Larger amount of and higher frequency RAM.</a:t>
             </a:r>
           </a:p>
           <a:p>
@@ -10776,7 +10770,17 @@
             </a:pPr>
             <a:r>
               <a:rPr lang="en-CA" dirty="0"/>
-              <a:t>Linux system instead of Windows</a:t>
+              <a:t>Linux system instead of Windows.</a:t>
+            </a:r>
+          </a:p>
+          <a:p>
+            <a:pPr marL="742950" lvl="1" indent="-285750">
+              <a:buFont typeface="Arial" panose="020B0604020202020204" pitchFamily="34" charset="0"/>
+              <a:buChar char="•"/>
+            </a:pPr>
+            <a:r>
+              <a:rPr lang="en-CA" dirty="0"/>
+              <a:t>Entire action space minus shift-and-add multiplication usage will be searched, estimated to take a day with 125 configurations.</a:t>
             </a:r>
           </a:p>
         </p:txBody>

</xml_diff>